<commit_message>
updating slides for graphics to include prefs correction and exam1 prep
</commit_message>
<xml_diff>
--- a/ClassMaterials/IntroToGraphics/Slides/Exam1-Prep.pptx
+++ b/ClassMaterials/IntroToGraphics/Slides/Exam1-Prep.pptx
@@ -265,7 +265,7 @@
           <a:p>
             <a:fld id="{13A3C157-BD0B-4164-8F04-95FC9C882640}" type="datetimeFigureOut">
               <a:rPr lang="en-US" smtClean="0"/>
-              <a:t>11/22/2022</a:t>
+              <a:t>12/12/2022</a:t>
             </a:fld>
             <a:endParaRPr lang="en-US"/>
           </a:p>
@@ -463,7 +463,7 @@
           <a:p>
             <a:fld id="{13A3C157-BD0B-4164-8F04-95FC9C882640}" type="datetimeFigureOut">
               <a:rPr lang="en-US" smtClean="0"/>
-              <a:t>11/22/2022</a:t>
+              <a:t>12/12/2022</a:t>
             </a:fld>
             <a:endParaRPr lang="en-US"/>
           </a:p>
@@ -671,7 +671,7 @@
           <a:p>
             <a:fld id="{13A3C157-BD0B-4164-8F04-95FC9C882640}" type="datetimeFigureOut">
               <a:rPr lang="en-US" smtClean="0"/>
-              <a:t>11/22/2022</a:t>
+              <a:t>12/12/2022</a:t>
             </a:fld>
             <a:endParaRPr lang="en-US"/>
           </a:p>
@@ -869,7 +869,7 @@
           <a:p>
             <a:fld id="{13A3C157-BD0B-4164-8F04-95FC9C882640}" type="datetimeFigureOut">
               <a:rPr lang="en-US" smtClean="0"/>
-              <a:t>11/22/2022</a:t>
+              <a:t>12/12/2022</a:t>
             </a:fld>
             <a:endParaRPr lang="en-US"/>
           </a:p>
@@ -1144,7 +1144,7 @@
           <a:p>
             <a:fld id="{13A3C157-BD0B-4164-8F04-95FC9C882640}" type="datetimeFigureOut">
               <a:rPr lang="en-US" smtClean="0"/>
-              <a:t>11/22/2022</a:t>
+              <a:t>12/12/2022</a:t>
             </a:fld>
             <a:endParaRPr lang="en-US"/>
           </a:p>
@@ -1409,7 +1409,7 @@
           <a:p>
             <a:fld id="{13A3C157-BD0B-4164-8F04-95FC9C882640}" type="datetimeFigureOut">
               <a:rPr lang="en-US" smtClean="0"/>
-              <a:t>11/22/2022</a:t>
+              <a:t>12/12/2022</a:t>
             </a:fld>
             <a:endParaRPr lang="en-US"/>
           </a:p>
@@ -1821,7 +1821,7 @@
           <a:p>
             <a:fld id="{13A3C157-BD0B-4164-8F04-95FC9C882640}" type="datetimeFigureOut">
               <a:rPr lang="en-US" smtClean="0"/>
-              <a:t>11/22/2022</a:t>
+              <a:t>12/12/2022</a:t>
             </a:fld>
             <a:endParaRPr lang="en-US"/>
           </a:p>
@@ -1962,7 +1962,7 @@
           <a:p>
             <a:fld id="{13A3C157-BD0B-4164-8F04-95FC9C882640}" type="datetimeFigureOut">
               <a:rPr lang="en-US" smtClean="0"/>
-              <a:t>11/22/2022</a:t>
+              <a:t>12/12/2022</a:t>
             </a:fld>
             <a:endParaRPr lang="en-US"/>
           </a:p>
@@ -2075,7 +2075,7 @@
           <a:p>
             <a:fld id="{13A3C157-BD0B-4164-8F04-95FC9C882640}" type="datetimeFigureOut">
               <a:rPr lang="en-US" smtClean="0"/>
-              <a:t>11/22/2022</a:t>
+              <a:t>12/12/2022</a:t>
             </a:fld>
             <a:endParaRPr lang="en-US"/>
           </a:p>
@@ -2386,7 +2386,7 @@
           <a:p>
             <a:fld id="{13A3C157-BD0B-4164-8F04-95FC9C882640}" type="datetimeFigureOut">
               <a:rPr lang="en-US" smtClean="0"/>
-              <a:t>11/22/2022</a:t>
+              <a:t>12/12/2022</a:t>
             </a:fld>
             <a:endParaRPr lang="en-US"/>
           </a:p>
@@ -2674,7 +2674,7 @@
           <a:p>
             <a:fld id="{13A3C157-BD0B-4164-8F04-95FC9C882640}" type="datetimeFigureOut">
               <a:rPr lang="en-US" smtClean="0"/>
-              <a:t>11/22/2022</a:t>
+              <a:t>12/12/2022</a:t>
             </a:fld>
             <a:endParaRPr lang="en-US"/>
           </a:p>
@@ -2915,7 +2915,7 @@
           <a:p>
             <a:fld id="{13A3C157-BD0B-4164-8F04-95FC9C882640}" type="datetimeFigureOut">
               <a:rPr lang="en-US" smtClean="0"/>
-              <a:t>11/22/2022</a:t>
+              <a:t>12/12/2022</a:t>
             </a:fld>
             <a:endParaRPr lang="en-US"/>
           </a:p>

</xml_diff>